<commit_message>
Module 3,4,7 slides + speaker slide in 1
without graphics/demos
</commit_message>
<xml_diff>
--- a/Slides/Module 1 - Getting started with CSS.pptx
+++ b/Slides/Module 1 - Getting started with CSS.pptx
@@ -230,7 +230,7 @@
           <a:p>
             <a:fld id="{312E7B4A-039C-48A2-9B2C-AF16AA3873D8}" type="datetimeFigureOut">
               <a:rPr lang="en-US" smtClean="0"/>
-              <a:t>11/20/2014</a:t>
+              <a:t>11/24/2014</a:t>
             </a:fld>
             <a:endParaRPr lang="en-US"/>
           </a:p>
@@ -395,7 +395,7 @@
           <a:p>
             <a:fld id="{DA005A0C-54D9-45AA-87D4-C551D08DFCE1}" type="datetimeFigureOut">
               <a:rPr lang="en-US" smtClean="0"/>
-              <a:t>11/20/2014</a:t>
+              <a:t>11/24/2014</a:t>
             </a:fld>
             <a:endParaRPr lang="en-US"/>
           </a:p>
@@ -7276,8 +7276,24 @@
           <a:lstStyle/>
           <a:p>
             <a:r>
-              <a:rPr lang="en-US" smtClean="0"/>
-              <a:t>Meet Jeffrey Snover | ‏@jsnover </a:t>
+              <a:rPr lang="en-US" dirty="0" smtClean="0"/>
+              <a:t>Meet </a:t>
+            </a:r>
+            <a:r>
+              <a:rPr lang="en-US" dirty="0" smtClean="0"/>
+              <a:t>Helen Zeng| </a:t>
+            </a:r>
+            <a:r>
+              <a:rPr lang="en-US" dirty="0" smtClean="0"/>
+              <a:t>‏</a:t>
+            </a:r>
+            <a:r>
+              <a:rPr lang="en-US" dirty="0" smtClean="0"/>
+              <a:t>@</a:t>
+            </a:r>
+            <a:r>
+              <a:rPr lang="en-US" dirty="0" err="1" smtClean="0"/>
+              <a:t>hwz</a:t>
             </a:r>
             <a:endParaRPr lang="en-US" dirty="0"/>
           </a:p>
@@ -7299,56 +7315,35 @@
           <a:lstStyle/>
           <a:p>
             <a:r>
-              <a:rPr lang="en-US" smtClean="0"/>
-              <a:t>Distinguished Engineer &amp; Lead Architect for </a:t>
-            </a:r>
-            <a:br>
-              <a:rPr lang="en-US" smtClean="0"/>
-            </a:br>
-            <a:r>
-              <a:rPr lang="en-US" smtClean="0"/>
-              <a:t>Windows Server &amp; System Center Division</a:t>
-            </a:r>
+              <a:rPr lang="en-US" dirty="0" smtClean="0"/>
+              <a:t>Developer Evangelist for Startups</a:t>
+            </a:r>
+            <a:endParaRPr lang="en-US" dirty="0" smtClean="0"/>
           </a:p>
           <a:p>
             <a:pPr lvl="1"/>
             <a:r>
-              <a:rPr lang="en-US" smtClean="0"/>
-              <a:t>Inventor of Windows PowerShell</a:t>
-            </a:r>
+              <a:rPr lang="en-US" dirty="0" smtClean="0"/>
+              <a:t>Description of Role</a:t>
+            </a:r>
+            <a:endParaRPr lang="en-US" dirty="0" smtClean="0"/>
+          </a:p>
+          <a:p>
+            <a:r>
+              <a:rPr lang="en-US" dirty="0" smtClean="0"/>
+              <a:t>Web development nerd</a:t>
+            </a:r>
+            <a:endParaRPr lang="en-US" dirty="0" smtClean="0"/>
           </a:p>
           <a:p>
             <a:pPr lvl="1"/>
             <a:r>
-              <a:rPr lang="en-US" smtClean="0"/>
-              <a:t>Responsible for setting long term technical vision for these products and running the technology planning for the releases</a:t>
-            </a:r>
-          </a:p>
-          <a:p>
-            <a:r>
-              <a:rPr lang="en-US" smtClean="0"/>
-              <a:t>Over 30 years of industry experience </a:t>
-            </a:r>
-          </a:p>
-          <a:p>
-            <a:pPr lvl="1"/>
-            <a:r>
-              <a:rPr lang="en-US" smtClean="0"/>
-              <a:t>Microsoft, Tivoli, NetView, DEC</a:t>
-            </a:r>
-          </a:p>
-          <a:p>
-            <a:pPr lvl="1"/>
-            <a:r>
-              <a:rPr lang="en-US" smtClean="0"/>
-              <a:t>Held 8 patents prior to joining Microsoft, and has registered 30 since. </a:t>
-            </a:r>
-          </a:p>
-          <a:p>
-            <a:pPr lvl="1"/>
-            <a:r>
-              <a:rPr lang="en-US" smtClean="0"/>
-              <a:t>Frequent speaker at industry and research conferences on a variety of management and language topics</a:t>
+              <a:rPr lang="en-US" dirty="0" smtClean="0"/>
+              <a:t>Node </a:t>
+            </a:r>
+            <a:r>
+              <a:rPr lang="en-US" dirty="0" err="1" smtClean="0"/>
+              <a:t>etc</a:t>
             </a:r>
             <a:endParaRPr lang="en-US" dirty="0" smtClean="0"/>
           </a:p>
@@ -7392,6 +7387,36 @@
               </a:prstClr>
             </a:outerShdw>
           </a:effectLst>
+        </p:spPr>
+      </p:pic>
+      <p:pic>
+        <p:nvPicPr>
+          <p:cNvPr id="3" name="Picture 2"/>
+          <p:cNvPicPr>
+            <a:picLocks noChangeAspect="1"/>
+          </p:cNvPicPr>
+          <p:nvPr/>
+        </p:nvPicPr>
+        <p:blipFill>
+          <a:blip r:embed="rId4">
+            <a:extLst>
+              <a:ext uri="{28A0092B-C50C-407E-A947-70E740481C1C}">
+                <a14:useLocalDpi xmlns:a14="http://schemas.microsoft.com/office/drawing/2010/main" val="0"/>
+              </a:ext>
+            </a:extLst>
+          </a:blip>
+          <a:stretch>
+            <a:fillRect/>
+          </a:stretch>
+        </p:blipFill>
+        <p:spPr>
+          <a:xfrm>
+            <a:off x="9658345" y="202030"/>
+            <a:ext cx="2372638" cy="2372638"/>
+          </a:xfrm>
+          <a:prstGeom prst="rect">
+            <a:avLst/>
+          </a:prstGeom>
         </p:spPr>
       </p:pic>
     </p:spTree>
@@ -8461,11 +8486,7 @@
             </a:pPr>
             <a:r>
               <a:rPr lang="en-US" dirty="0" smtClean="0"/>
-              <a:t>Misses </a:t>
-            </a:r>
-            <a:r>
-              <a:rPr lang="en-US" dirty="0" smtClean="0"/>
-              <a:t>his Commodore 64</a:t>
+              <a:t>Misses his Commodore 64</a:t>
             </a:r>
           </a:p>
           <a:p>
@@ -8483,13 +8504,8 @@
             </a:pPr>
             <a:r>
               <a:rPr lang="en-US" dirty="0" smtClean="0"/>
-              <a:t>Regular presenter at </a:t>
-            </a:r>
-            <a:r>
-              <a:rPr lang="en-US" dirty="0" smtClean="0"/>
-              <a:t>conferences</a:t>
-            </a:r>
-            <a:endParaRPr lang="en-US" dirty="0" smtClean="0"/>
+              <a:t>Regular presenter at conferences</a:t>
+            </a:r>
           </a:p>
           <a:p>
             <a:pPr marL="457046" lvl="1" indent="0">
@@ -8560,11 +8576,11 @@
   <p:clrMapOvr>
     <a:masterClrMapping/>
   </p:clrMapOvr>
-  <mc:AlternateContent xmlns:mc="http://schemas.openxmlformats.org/markup-compatibility/2006">
-    <mc:Choice xmlns:p14="http://schemas.microsoft.com/office/powerpoint/2010/main" Requires="p14">
+  <mc:AlternateContent xmlns:mc="http://schemas.openxmlformats.org/markup-compatibility/2006" xmlns:p14="http://schemas.microsoft.com/office/powerpoint/2010/main">
+    <mc:Choice Requires="p14">
       <p:transition spd="slow" p14:dur="2000"/>
     </mc:Choice>
-    <mc:Fallback>
+    <mc:Fallback xmlns="">
       <p:transition spd="slow"/>
     </mc:Fallback>
   </mc:AlternateContent>
@@ -8650,14 +8666,14 @@
                 <a:gridCol w="5762625">
                   <a:extLst>
                     <a:ext uri="{9D8B030D-6E8A-4147-A177-3AD203B41FA5}">
-                      <a16:colId xmlns:a16="http://schemas.microsoft.com/office/drawing/2014/main" xmlns="" val="1632794655"/>
+                      <a16:colId xmlns="" xmlns:a16="http://schemas.microsoft.com/office/drawing/2014/main" val="1632794655"/>
                     </a:ext>
                   </a:extLst>
                 </a:gridCol>
                 <a:gridCol w="5762625">
                   <a:extLst>
                     <a:ext uri="{9D8B030D-6E8A-4147-A177-3AD203B41FA5}">
-                      <a16:colId xmlns:a16="http://schemas.microsoft.com/office/drawing/2014/main" xmlns="" val="2011313899"/>
+                      <a16:colId xmlns="" xmlns:a16="http://schemas.microsoft.com/office/drawing/2014/main" val="2011313899"/>
                     </a:ext>
                   </a:extLst>
                 </a:gridCol>
@@ -8695,7 +8711,7 @@
                 </a:tc>
                 <a:extLst>
                   <a:ext uri="{0D108BD9-81ED-4DB2-BD59-A6C34878D82A}">
-                    <a16:rowId xmlns:a16="http://schemas.microsoft.com/office/drawing/2014/main" xmlns="" val="1789177411"/>
+                    <a16:rowId xmlns="" xmlns:a16="http://schemas.microsoft.com/office/drawing/2014/main" val="1789177411"/>
                   </a:ext>
                 </a:extLst>
               </a:tr>
@@ -8710,14 +8726,7 @@
                           <a:latin typeface="Segoe UI Light" panose="020B0502040204020203" pitchFamily="34" charset="0"/>
                           <a:cs typeface="Segoe UI Light" panose="020B0502040204020203" pitchFamily="34" charset="0"/>
                         </a:rPr>
-                        <a:t>01 | </a:t>
-                      </a:r>
-                      <a:r>
-                        <a:rPr lang="en-US" sz="2400" dirty="0" smtClean="0">
-                          <a:latin typeface="Segoe UI Light" panose="020B0502040204020203" pitchFamily="34" charset="0"/>
-                          <a:cs typeface="Segoe UI Light" panose="020B0502040204020203" pitchFamily="34" charset="0"/>
-                        </a:rPr>
-                        <a:t>Getting started with CSS</a:t>
+                        <a:t>01 | Getting started with CSS</a:t>
                       </a:r>
                       <a:endParaRPr lang="en-US" sz="2400" dirty="0">
                         <a:latin typeface="Segoe UI Light" panose="020B0502040204020203" pitchFamily="34" charset="0"/>
@@ -8737,21 +8746,7 @@
                           <a:latin typeface="Segoe UI Light" panose="020B0502040204020203" pitchFamily="34" charset="0"/>
                           <a:cs typeface="Segoe UI Light" panose="020B0502040204020203" pitchFamily="34" charset="0"/>
                         </a:rPr>
-                        <a:t>04 </a:t>
-                      </a:r>
-                      <a:r>
-                        <a:rPr lang="en-US" sz="2400" dirty="0" smtClean="0">
-                          <a:latin typeface="Segoe UI Light" panose="020B0502040204020203" pitchFamily="34" charset="0"/>
-                          <a:cs typeface="Segoe UI Light" panose="020B0502040204020203" pitchFamily="34" charset="0"/>
-                        </a:rPr>
-                        <a:t>| </a:t>
-                      </a:r>
-                      <a:r>
-                        <a:rPr lang="en-US" sz="2400" dirty="0" smtClean="0">
-                          <a:latin typeface="Segoe UI Light" panose="020B0502040204020203" pitchFamily="34" charset="0"/>
-                          <a:cs typeface="Segoe UI Light" panose="020B0502040204020203" pitchFamily="34" charset="0"/>
-                        </a:rPr>
-                        <a:t>Media queries</a:t>
+                        <a:t>04 | Media queries</a:t>
                       </a:r>
                       <a:endParaRPr lang="en-US" sz="2400" dirty="0">
                         <a:latin typeface="Segoe UI Light" panose="020B0502040204020203" pitchFamily="34" charset="0"/>
@@ -8763,7 +8758,7 @@
                 </a:tc>
                 <a:extLst>
                   <a:ext uri="{0D108BD9-81ED-4DB2-BD59-A6C34878D82A}">
-                    <a16:rowId xmlns:a16="http://schemas.microsoft.com/office/drawing/2014/main" xmlns="" val="3842815335"/>
+                    <a16:rowId xmlns="" xmlns:a16="http://schemas.microsoft.com/office/drawing/2014/main" val="3842815335"/>
                   </a:ext>
                 </a:extLst>
               </a:tr>
@@ -8778,14 +8773,7 @@
                           <a:latin typeface="Segoe UI Light" panose="020B0502040204020203" pitchFamily="34" charset="0"/>
                           <a:cs typeface="Segoe UI Light" panose="020B0502040204020203" pitchFamily="34" charset="0"/>
                         </a:rPr>
-                        <a:t>02 | </a:t>
-                      </a:r>
-                      <a:r>
-                        <a:rPr lang="en-US" sz="2400" dirty="0" smtClean="0">
-                          <a:latin typeface="Segoe UI Light" panose="020B0502040204020203" pitchFamily="34" charset="0"/>
-                          <a:cs typeface="Segoe UI Light" panose="020B0502040204020203" pitchFamily="34" charset="0"/>
-                        </a:rPr>
-                        <a:t>CSS selectors</a:t>
+                        <a:t>02 | CSS selectors</a:t>
                       </a:r>
                       <a:endParaRPr lang="en-US" sz="2400" dirty="0">
                         <a:latin typeface="Segoe UI Light" panose="020B0502040204020203" pitchFamily="34" charset="0"/>
@@ -8805,21 +8793,7 @@
                           <a:latin typeface="Segoe UI Light" panose="020B0502040204020203" pitchFamily="34" charset="0"/>
                           <a:cs typeface="Segoe UI Light" panose="020B0502040204020203" pitchFamily="34" charset="0"/>
                         </a:rPr>
-                        <a:t>05 </a:t>
-                      </a:r>
-                      <a:r>
-                        <a:rPr lang="en-US" sz="2400" dirty="0" smtClean="0">
-                          <a:latin typeface="Segoe UI Light" panose="020B0502040204020203" pitchFamily="34" charset="0"/>
-                          <a:cs typeface="Segoe UI Light" panose="020B0502040204020203" pitchFamily="34" charset="0"/>
-                        </a:rPr>
-                        <a:t>| </a:t>
-                      </a:r>
-                      <a:r>
-                        <a:rPr lang="en-US" sz="2400" dirty="0" smtClean="0">
-                          <a:latin typeface="Segoe UI Light" panose="020B0502040204020203" pitchFamily="34" charset="0"/>
-                          <a:cs typeface="Segoe UI Light" panose="020B0502040204020203" pitchFamily="34" charset="0"/>
-                        </a:rPr>
-                        <a:t>Transformations and transitions</a:t>
+                        <a:t>05 | Transformations and transitions</a:t>
                       </a:r>
                       <a:endParaRPr lang="en-US" sz="2400" dirty="0">
                         <a:latin typeface="Segoe UI Light" panose="020B0502040204020203" pitchFamily="34" charset="0"/>
@@ -8831,7 +8805,7 @@
                 </a:tc>
                 <a:extLst>
                   <a:ext uri="{0D108BD9-81ED-4DB2-BD59-A6C34878D82A}">
-                    <a16:rowId xmlns:a16="http://schemas.microsoft.com/office/drawing/2014/main" xmlns="" val="321066646"/>
+                    <a16:rowId xmlns="" xmlns:a16="http://schemas.microsoft.com/office/drawing/2014/main" val="321066646"/>
                   </a:ext>
                 </a:extLst>
               </a:tr>
@@ -8870,14 +8844,7 @@
                           <a:latin typeface="Segoe UI Light" panose="020B0502040204020203" pitchFamily="34" charset="0"/>
                           <a:cs typeface="Segoe UI Light" panose="020B0502040204020203" pitchFamily="34" charset="0"/>
                         </a:rPr>
-                        <a:t> | </a:t>
-                      </a:r>
-                      <a:r>
-                        <a:rPr lang="en-US" sz="2400" baseline="0" dirty="0" smtClean="0">
-                          <a:latin typeface="Segoe UI Light" panose="020B0502040204020203" pitchFamily="34" charset="0"/>
-                          <a:cs typeface="Segoe UI Light" panose="020B0502040204020203" pitchFamily="34" charset="0"/>
-                        </a:rPr>
-                        <a:t>Page layouts</a:t>
+                        <a:t> | Page layouts</a:t>
                       </a:r>
                       <a:endParaRPr lang="en-US" sz="2400" dirty="0" smtClean="0">
                         <a:latin typeface="Segoe UI Light" panose="020B0502040204020203" pitchFamily="34" charset="0"/>
@@ -8897,21 +8864,7 @@
                           <a:latin typeface="Segoe UI Light" panose="020B0502040204020203" pitchFamily="34" charset="0"/>
                           <a:cs typeface="Segoe UI Light" panose="020B0502040204020203" pitchFamily="34" charset="0"/>
                         </a:rPr>
-                        <a:t>06 </a:t>
-                      </a:r>
-                      <a:r>
-                        <a:rPr lang="en-US" sz="2400" dirty="0" smtClean="0">
-                          <a:latin typeface="Segoe UI Light" panose="020B0502040204020203" pitchFamily="34" charset="0"/>
-                          <a:cs typeface="Segoe UI Light" panose="020B0502040204020203" pitchFamily="34" charset="0"/>
-                        </a:rPr>
-                        <a:t>| </a:t>
-                      </a:r>
-                      <a:r>
-                        <a:rPr lang="en-US" sz="2400" dirty="0" smtClean="0">
-                          <a:latin typeface="Segoe UI Light" panose="020B0502040204020203" pitchFamily="34" charset="0"/>
-                          <a:cs typeface="Segoe UI Light" panose="020B0502040204020203" pitchFamily="34" charset="0"/>
-                        </a:rPr>
-                        <a:t>CSS preprocessors</a:t>
+                        <a:t>06 | CSS preprocessors</a:t>
                       </a:r>
                       <a:endParaRPr lang="en-US" sz="2400" dirty="0">
                         <a:latin typeface="Segoe UI Light" panose="020B0502040204020203" pitchFamily="34" charset="0"/>
@@ -8923,7 +8876,7 @@
                 </a:tc>
                 <a:extLst>
                   <a:ext uri="{0D108BD9-81ED-4DB2-BD59-A6C34878D82A}">
-                    <a16:rowId xmlns:a16="http://schemas.microsoft.com/office/drawing/2014/main" xmlns="" val="3812060533"/>
+                    <a16:rowId xmlns="" xmlns:a16="http://schemas.microsoft.com/office/drawing/2014/main" val="3812060533"/>
                   </a:ext>
                 </a:extLst>
               </a:tr>
@@ -9033,7 +8986,6 @@
               <a:rPr lang="en-US" dirty="0" smtClean="0"/>
               <a:t>Developers with CSS experience looking to fill gaps</a:t>
             </a:r>
-            <a:endParaRPr lang="en-US" dirty="0" smtClean="0"/>
           </a:p>
           <a:p>
             <a:r>
@@ -9146,15 +9098,7 @@
             </a:r>
             <a:r>
               <a:rPr lang="en-US" dirty="0" smtClean="0"/>
-              <a:t>2.5</a:t>
-            </a:r>
-            <a:r>
-              <a:rPr lang="en-US" dirty="0" smtClean="0"/>
-              <a:t>M </a:t>
-            </a:r>
-            <a:r>
-              <a:rPr lang="en-US" dirty="0" smtClean="0"/>
-              <a:t>registered users</a:t>
+              <a:t>2.5M registered users</a:t>
             </a:r>
           </a:p>
           <a:p>
@@ -9326,11 +9270,7 @@
             <a:pPr marL="914400" indent="-914400"/>
             <a:r>
               <a:rPr lang="en-US" dirty="0" smtClean="0"/>
-              <a:t>01 | </a:t>
-            </a:r>
-            <a:r>
-              <a:rPr lang="en-US" dirty="0" smtClean="0"/>
-              <a:t>Getting started with CSS</a:t>
+              <a:t>01 | Getting started with CSS</a:t>
             </a:r>
             <a:endParaRPr lang="en-US" dirty="0"/>
           </a:p>
@@ -9361,7 +9301,6 @@
               <a:rPr lang="en-US" dirty="0"/>
               <a:t>Christopher Harrison | Content Developer</a:t>
             </a:r>
-            <a:endParaRPr lang="en-US" dirty="0"/>
           </a:p>
         </p:txBody>
       </p:sp>
@@ -10371,9 +10310,12 @@
 </file>
 
 <file path=customXml/item1.xml><?xml version="1.0" encoding="utf-8"?>
-<p:properties xmlns:p="http://schemas.microsoft.com/office/2006/metadata/properties" xmlns:xsi="http://www.w3.org/2001/XMLSchema-instance" xmlns:pc="http://schemas.microsoft.com/office/infopath/2007/PartnerControls">
-  <documentManagement/>
-</p:properties>
+<?mso-contentType ?>
+<FormTemplates xmlns="http://schemas.microsoft.com/sharepoint/v3/contenttype/forms">
+  <Display>DocumentLibraryForm</Display>
+  <Edit>DocumentLibraryForm</Edit>
+  <New>DocumentLibraryForm</New>
+</FormTemplates>
 </file>
 
 <file path=customXml/item2.xml><?xml version="1.0" encoding="utf-8"?>
@@ -10517,19 +10459,15 @@
 </file>
 
 <file path=customXml/item3.xml><?xml version="1.0" encoding="utf-8"?>
-<?mso-contentType ?>
-<FormTemplates xmlns="http://schemas.microsoft.com/sharepoint/v3/contenttype/forms">
-  <Display>DocumentLibraryForm</Display>
-  <Edit>DocumentLibraryForm</Edit>
-  <New>DocumentLibraryForm</New>
-</FormTemplates>
+<p:properties xmlns:p="http://schemas.microsoft.com/office/2006/metadata/properties" xmlns:xsi="http://www.w3.org/2001/XMLSchema-instance" xmlns:pc="http://schemas.microsoft.com/office/infopath/2007/PartnerControls">
+  <documentManagement/>
+</p:properties>
 </file>
 
 <file path=customXml/itemProps1.xml><?xml version="1.0" encoding="utf-8"?>
-<ds:datastoreItem xmlns:ds="http://schemas.openxmlformats.org/officeDocument/2006/customXml" ds:itemID="{7025FDD9-4C58-4084-9F89-0E6ADD6FFF55}">
+<ds:datastoreItem xmlns:ds="http://schemas.openxmlformats.org/officeDocument/2006/customXml" ds:itemID="{B0CA13EC-1D3C-4D6F-8D1C-E8A452CFC79A}">
   <ds:schemaRefs>
-    <ds:schemaRef ds:uri="http://schemas.microsoft.com/office/2006/metadata/properties"/>
-    <ds:schemaRef ds:uri="http://schemas.microsoft.com/office/infopath/2007/PartnerControls"/>
+    <ds:schemaRef ds:uri="http://schemas.microsoft.com/sharepoint/v3/contenttype/forms"/>
   </ds:schemaRefs>
 </ds:datastoreItem>
 </file>
@@ -10553,9 +10491,10 @@
 </file>
 
 <file path=customXml/itemProps3.xml><?xml version="1.0" encoding="utf-8"?>
-<ds:datastoreItem xmlns:ds="http://schemas.openxmlformats.org/officeDocument/2006/customXml" ds:itemID="{B0CA13EC-1D3C-4D6F-8D1C-E8A452CFC79A}">
+<ds:datastoreItem xmlns:ds="http://schemas.openxmlformats.org/officeDocument/2006/customXml" ds:itemID="{7025FDD9-4C58-4084-9F89-0E6ADD6FFF55}">
   <ds:schemaRefs>
-    <ds:schemaRef ds:uri="http://schemas.microsoft.com/sharepoint/v3/contenttype/forms"/>
+    <ds:schemaRef ds:uri="http://schemas.microsoft.com/office/2006/metadata/properties"/>
+    <ds:schemaRef ds:uri="http://schemas.microsoft.com/office/infopath/2007/PartnerControls"/>
   </ds:schemaRefs>
 </ds:datastoreItem>
 </file>
</xml_diff>

<commit_message>
Mod 1 Slide + Additions to Mod 6
</commit_message>
<xml_diff>
--- a/Slides/Module 1 - Getting started with CSS.pptx
+++ b/Slides/Module 1 - Getting started with CSS.pptx
@@ -230,7 +230,7 @@
           <a:p>
             <a:fld id="{312E7B4A-039C-48A2-9B2C-AF16AA3873D8}" type="datetimeFigureOut">
               <a:rPr lang="en-US" smtClean="0"/>
-              <a:t>11/24/2014</a:t>
+              <a:t>12/3/2014</a:t>
             </a:fld>
             <a:endParaRPr lang="en-US"/>
           </a:p>
@@ -395,7 +395,7 @@
           <a:p>
             <a:fld id="{DA005A0C-54D9-45AA-87D4-C551D08DFCE1}" type="datetimeFigureOut">
               <a:rPr lang="en-US" smtClean="0"/>
-              <a:t>11/24/2014</a:t>
+              <a:t>12/3/2014</a:t>
             </a:fld>
             <a:endParaRPr lang="en-US"/>
           </a:p>
@@ -7277,19 +7277,7 @@
           <a:p>
             <a:r>
               <a:rPr lang="en-US" dirty="0" smtClean="0"/>
-              <a:t>Meet </a:t>
-            </a:r>
-            <a:r>
-              <a:rPr lang="en-US" dirty="0" smtClean="0"/>
-              <a:t>Helen Zeng| </a:t>
-            </a:r>
-            <a:r>
-              <a:rPr lang="en-US" dirty="0" smtClean="0"/>
-              <a:t>‏</a:t>
-            </a:r>
-            <a:r>
-              <a:rPr lang="en-US" dirty="0" smtClean="0"/>
-              <a:t>@</a:t>
+              <a:t>Meet Helen Zeng| ‏@</a:t>
             </a:r>
             <a:r>
               <a:rPr lang="en-US" dirty="0" err="1" smtClean="0"/>
@@ -7316,35 +7304,105 @@
           <a:p>
             <a:r>
               <a:rPr lang="en-US" dirty="0" smtClean="0"/>
-              <a:t>Developer Evangelist for Startups</a:t>
+              <a:t>Developer Evangelist for </a:t>
+            </a:r>
+            <a:r>
+              <a:rPr lang="en-US" dirty="0" smtClean="0"/>
+              <a:t>Startups</a:t>
+            </a:r>
+          </a:p>
+          <a:p>
+            <a:pPr marL="457046" lvl="1" indent="0">
+              <a:buNone/>
+            </a:pPr>
+            <a:r>
+              <a:rPr lang="en-US" dirty="0" smtClean="0"/>
+              <a:t>Works with top tier startups out of the bay area</a:t>
+            </a:r>
+          </a:p>
+          <a:p>
+            <a:pPr marL="457046" lvl="1" indent="0">
+              <a:buNone/>
+            </a:pPr>
+            <a:r>
+              <a:rPr lang="en-US" dirty="0" smtClean="0"/>
+              <a:t>Focused on Azure and apps</a:t>
+            </a:r>
+          </a:p>
+          <a:p>
+            <a:pPr marL="457046" lvl="1" indent="0">
+              <a:buNone/>
+            </a:pPr>
+            <a:r>
+              <a:rPr lang="en-US" dirty="0" smtClean="0"/>
+              <a:t>Spreads the word of </a:t>
+            </a:r>
+            <a:r>
+              <a:rPr lang="en-US" dirty="0" err="1" smtClean="0"/>
+              <a:t>Bizspark</a:t>
             </a:r>
             <a:endParaRPr lang="en-US" dirty="0" smtClean="0"/>
           </a:p>
           <a:p>
-            <a:pPr lvl="1"/>
-            <a:r>
-              <a:rPr lang="en-US" dirty="0" smtClean="0"/>
-              <a:t>Description of Role</a:t>
+            <a:r>
+              <a:rPr lang="en-US" dirty="0" smtClean="0"/>
+              <a:t>Too “San Francisco”</a:t>
+            </a:r>
+          </a:p>
+          <a:p>
+            <a:pPr marL="457046" lvl="1" indent="0">
+              <a:buNone/>
+            </a:pPr>
+            <a:r>
+              <a:rPr lang="en-US" dirty="0" smtClean="0"/>
+              <a:t>Volunteer CS teacher</a:t>
+            </a:r>
+          </a:p>
+          <a:p>
+            <a:pPr marL="457046" lvl="1" indent="0">
+              <a:buNone/>
+            </a:pPr>
+            <a:r>
+              <a:rPr lang="en-US" dirty="0" smtClean="0"/>
+              <a:t>MEAN Stack Advocate</a:t>
+            </a:r>
+          </a:p>
+          <a:p>
+            <a:pPr marL="457046" lvl="1" indent="0">
+              <a:buNone/>
+            </a:pPr>
+            <a:r>
+              <a:rPr lang="en-US" dirty="0" smtClean="0"/>
+              <a:t>Borderline-obsessive about Game of Thrones/</a:t>
+            </a:r>
+            <a:r>
+              <a:rPr lang="en-US" dirty="0" err="1" smtClean="0"/>
+              <a:t>ASoIF</a:t>
             </a:r>
             <a:endParaRPr lang="en-US" dirty="0" smtClean="0"/>
           </a:p>
           <a:p>
-            <a:r>
-              <a:rPr lang="en-US" dirty="0" smtClean="0"/>
-              <a:t>Web development nerd</a:t>
-            </a:r>
+            <a:pPr marL="457046" lvl="1" indent="0">
+              <a:buNone/>
+            </a:pPr>
             <a:endParaRPr lang="en-US" dirty="0" smtClean="0"/>
           </a:p>
           <a:p>
-            <a:pPr lvl="1"/>
-            <a:r>
-              <a:rPr lang="en-US" dirty="0" smtClean="0"/>
-              <a:t>Node </a:t>
-            </a:r>
-            <a:r>
-              <a:rPr lang="en-US" dirty="0" err="1" smtClean="0"/>
-              <a:t>etc</a:t>
-            </a:r>
+            <a:pPr marL="457046" lvl="1" indent="0">
+              <a:buNone/>
+            </a:pPr>
+            <a:endParaRPr lang="en-US" dirty="0" smtClean="0"/>
+          </a:p>
+          <a:p>
+            <a:pPr marL="457046" lvl="1" indent="0">
+              <a:buNone/>
+            </a:pPr>
+            <a:endParaRPr lang="en-US" dirty="0" smtClean="0"/>
+          </a:p>
+          <a:p>
+            <a:pPr marL="457046" lvl="1" indent="0">
+              <a:buNone/>
+            </a:pPr>
             <a:endParaRPr lang="en-US" dirty="0" smtClean="0"/>
           </a:p>
         </p:txBody>
@@ -8666,14 +8724,14 @@
                 <a:gridCol w="5762625">
                   <a:extLst>
                     <a:ext uri="{9D8B030D-6E8A-4147-A177-3AD203B41FA5}">
-                      <a16:colId xmlns="" xmlns:a16="http://schemas.microsoft.com/office/drawing/2014/main" val="1632794655"/>
+                      <a16:colId xmlns:a16="http://schemas.microsoft.com/office/drawing/2014/main" xmlns="" val="1632794655"/>
                     </a:ext>
                   </a:extLst>
                 </a:gridCol>
                 <a:gridCol w="5762625">
                   <a:extLst>
                     <a:ext uri="{9D8B030D-6E8A-4147-A177-3AD203B41FA5}">
-                      <a16:colId xmlns="" xmlns:a16="http://schemas.microsoft.com/office/drawing/2014/main" val="2011313899"/>
+                      <a16:colId xmlns:a16="http://schemas.microsoft.com/office/drawing/2014/main" xmlns="" val="2011313899"/>
                     </a:ext>
                   </a:extLst>
                 </a:gridCol>
@@ -8711,7 +8769,7 @@
                 </a:tc>
                 <a:extLst>
                   <a:ext uri="{0D108BD9-81ED-4DB2-BD59-A6C34878D82A}">
-                    <a16:rowId xmlns="" xmlns:a16="http://schemas.microsoft.com/office/drawing/2014/main" val="1789177411"/>
+                    <a16:rowId xmlns:a16="http://schemas.microsoft.com/office/drawing/2014/main" xmlns="" val="1789177411"/>
                   </a:ext>
                 </a:extLst>
               </a:tr>
@@ -8758,7 +8816,7 @@
                 </a:tc>
                 <a:extLst>
                   <a:ext uri="{0D108BD9-81ED-4DB2-BD59-A6C34878D82A}">
-                    <a16:rowId xmlns="" xmlns:a16="http://schemas.microsoft.com/office/drawing/2014/main" val="3842815335"/>
+                    <a16:rowId xmlns:a16="http://schemas.microsoft.com/office/drawing/2014/main" xmlns="" val="3842815335"/>
                   </a:ext>
                 </a:extLst>
               </a:tr>
@@ -8805,7 +8863,7 @@
                 </a:tc>
                 <a:extLst>
                   <a:ext uri="{0D108BD9-81ED-4DB2-BD59-A6C34878D82A}">
-                    <a16:rowId xmlns="" xmlns:a16="http://schemas.microsoft.com/office/drawing/2014/main" val="321066646"/>
+                    <a16:rowId xmlns:a16="http://schemas.microsoft.com/office/drawing/2014/main" xmlns="" val="321066646"/>
                   </a:ext>
                 </a:extLst>
               </a:tr>
@@ -8876,7 +8934,7 @@
                 </a:tc>
                 <a:extLst>
                   <a:ext uri="{0D108BD9-81ED-4DB2-BD59-A6C34878D82A}">
-                    <a16:rowId xmlns="" xmlns:a16="http://schemas.microsoft.com/office/drawing/2014/main" val="3812060533"/>
+                    <a16:rowId xmlns:a16="http://schemas.microsoft.com/office/drawing/2014/main" xmlns="" val="3812060533"/>
                   </a:ext>
                 </a:extLst>
               </a:tr>
@@ -10310,12 +10368,9 @@
 </file>
 
 <file path=customXml/item1.xml><?xml version="1.0" encoding="utf-8"?>
-<?mso-contentType ?>
-<FormTemplates xmlns="http://schemas.microsoft.com/sharepoint/v3/contenttype/forms">
-  <Display>DocumentLibraryForm</Display>
-  <Edit>DocumentLibraryForm</Edit>
-  <New>DocumentLibraryForm</New>
-</FormTemplates>
+<p:properties xmlns:p="http://schemas.microsoft.com/office/2006/metadata/properties" xmlns:xsi="http://www.w3.org/2001/XMLSchema-instance" xmlns:pc="http://schemas.microsoft.com/office/infopath/2007/PartnerControls">
+  <documentManagement/>
+</p:properties>
 </file>
 
 <file path=customXml/item2.xml><?xml version="1.0" encoding="utf-8"?>
@@ -10459,15 +10514,19 @@
 </file>
 
 <file path=customXml/item3.xml><?xml version="1.0" encoding="utf-8"?>
-<p:properties xmlns:p="http://schemas.microsoft.com/office/2006/metadata/properties" xmlns:xsi="http://www.w3.org/2001/XMLSchema-instance" xmlns:pc="http://schemas.microsoft.com/office/infopath/2007/PartnerControls">
-  <documentManagement/>
-</p:properties>
+<?mso-contentType ?>
+<FormTemplates xmlns="http://schemas.microsoft.com/sharepoint/v3/contenttype/forms">
+  <Display>DocumentLibraryForm</Display>
+  <Edit>DocumentLibraryForm</Edit>
+  <New>DocumentLibraryForm</New>
+</FormTemplates>
 </file>
 
 <file path=customXml/itemProps1.xml><?xml version="1.0" encoding="utf-8"?>
-<ds:datastoreItem xmlns:ds="http://schemas.openxmlformats.org/officeDocument/2006/customXml" ds:itemID="{B0CA13EC-1D3C-4D6F-8D1C-E8A452CFC79A}">
+<ds:datastoreItem xmlns:ds="http://schemas.openxmlformats.org/officeDocument/2006/customXml" ds:itemID="{7025FDD9-4C58-4084-9F89-0E6ADD6FFF55}">
   <ds:schemaRefs>
-    <ds:schemaRef ds:uri="http://schemas.microsoft.com/sharepoint/v3/contenttype/forms"/>
+    <ds:schemaRef ds:uri="http://schemas.microsoft.com/office/2006/metadata/properties"/>
+    <ds:schemaRef ds:uri="http://schemas.microsoft.com/office/infopath/2007/PartnerControls"/>
   </ds:schemaRefs>
 </ds:datastoreItem>
 </file>
@@ -10491,10 +10550,9 @@
 </file>
 
 <file path=customXml/itemProps3.xml><?xml version="1.0" encoding="utf-8"?>
-<ds:datastoreItem xmlns:ds="http://schemas.openxmlformats.org/officeDocument/2006/customXml" ds:itemID="{7025FDD9-4C58-4084-9F89-0E6ADD6FFF55}">
+<ds:datastoreItem xmlns:ds="http://schemas.openxmlformats.org/officeDocument/2006/customXml" ds:itemID="{B0CA13EC-1D3C-4D6F-8D1C-E8A452CFC79A}">
   <ds:schemaRefs>
-    <ds:schemaRef ds:uri="http://schemas.microsoft.com/office/2006/metadata/properties"/>
-    <ds:schemaRef ds:uri="http://schemas.microsoft.com/office/infopath/2007/PartnerControls"/>
+    <ds:schemaRef ds:uri="http://schemas.microsoft.com/sharepoint/v3/contenttype/forms"/>
   </ds:schemaRefs>
 </ds:datastoreItem>
 </file>
</xml_diff>